<commit_message>
update image for in person workshop
</commit_message>
<xml_diff>
--- a/source/_images/contributorWorkshopFeb23Announcement.pptx
+++ b/source/_images/contributorWorkshopFeb23Announcement.pptx
@@ -6,6 +6,8 @@
   </p:sldMasterIdLst>
   <p:sldIdLst>
     <p:sldId id="258" r:id="rId2"/>
+    <p:sldId id="259" r:id="rId3"/>
+    <p:sldId id="260" r:id="rId4"/>
   </p:sldIdLst>
   <p:sldSz cx="12192000" cy="6858000"/>
   <p:notesSz cx="6858000" cy="9144000"/>
@@ -241,7 +243,7 @@
           <a:p>
             <a:fld id="{C764DE79-268F-4C1A-8933-263129D2AF90}" type="datetimeFigureOut">
               <a:rPr lang="en-US" dirty="0"/>
-              <a:t>1/4/23</a:t>
+              <a:t>2/3/2023</a:t>
             </a:fld>
             <a:endParaRPr lang="en-US"/>
           </a:p>
@@ -409,7 +411,7 @@
           <a:p>
             <a:fld id="{C764DE79-268F-4C1A-8933-263129D2AF90}" type="datetimeFigureOut">
               <a:rPr lang="en-US" dirty="0"/>
-              <a:t>1/4/23</a:t>
+              <a:t>2/3/2023</a:t>
             </a:fld>
             <a:endParaRPr lang="en-US"/>
           </a:p>
@@ -587,7 +589,7 @@
           <a:p>
             <a:fld id="{C764DE79-268F-4C1A-8933-263129D2AF90}" type="datetimeFigureOut">
               <a:rPr lang="en-US" dirty="0"/>
-              <a:t>1/4/23</a:t>
+              <a:t>2/3/2023</a:t>
             </a:fld>
             <a:endParaRPr lang="en-US"/>
           </a:p>
@@ -755,7 +757,7 @@
           <a:p>
             <a:fld id="{C764DE79-268F-4C1A-8933-263129D2AF90}" type="datetimeFigureOut">
               <a:rPr lang="en-US" dirty="0"/>
-              <a:t>1/4/23</a:t>
+              <a:t>2/3/2023</a:t>
             </a:fld>
             <a:endParaRPr lang="en-US"/>
           </a:p>
@@ -1000,7 +1002,7 @@
           <a:p>
             <a:fld id="{C764DE79-268F-4C1A-8933-263129D2AF90}" type="datetimeFigureOut">
               <a:rPr lang="en-US" dirty="0"/>
-              <a:t>1/4/23</a:t>
+              <a:t>2/3/2023</a:t>
             </a:fld>
             <a:endParaRPr lang="en-US"/>
           </a:p>
@@ -1229,7 +1231,7 @@
           <a:p>
             <a:fld id="{C764DE79-268F-4C1A-8933-263129D2AF90}" type="datetimeFigureOut">
               <a:rPr lang="en-US" dirty="0"/>
-              <a:t>1/4/23</a:t>
+              <a:t>2/3/2023</a:t>
             </a:fld>
             <a:endParaRPr lang="en-US"/>
           </a:p>
@@ -1593,7 +1595,7 @@
           <a:p>
             <a:fld id="{C764DE79-268F-4C1A-8933-263129D2AF90}" type="datetimeFigureOut">
               <a:rPr lang="en-US" dirty="0"/>
-              <a:t>1/4/23</a:t>
+              <a:t>2/3/2023</a:t>
             </a:fld>
             <a:endParaRPr lang="en-US"/>
           </a:p>
@@ -1710,7 +1712,7 @@
           <a:p>
             <a:fld id="{C764DE79-268F-4C1A-8933-263129D2AF90}" type="datetimeFigureOut">
               <a:rPr lang="en-US" dirty="0"/>
-              <a:t>1/4/23</a:t>
+              <a:t>2/3/2023</a:t>
             </a:fld>
             <a:endParaRPr lang="en-US"/>
           </a:p>
@@ -1805,7 +1807,7 @@
           <a:p>
             <a:fld id="{C764DE79-268F-4C1A-8933-263129D2AF90}" type="datetimeFigureOut">
               <a:rPr lang="en-US" dirty="0"/>
-              <a:t>1/4/23</a:t>
+              <a:t>2/3/2023</a:t>
             </a:fld>
             <a:endParaRPr lang="en-US"/>
           </a:p>
@@ -2080,7 +2082,7 @@
           <a:p>
             <a:fld id="{C764DE79-268F-4C1A-8933-263129D2AF90}" type="datetimeFigureOut">
               <a:rPr lang="en-US" dirty="0"/>
-              <a:t>1/4/23</a:t>
+              <a:t>2/3/2023</a:t>
             </a:fld>
             <a:endParaRPr lang="en-US"/>
           </a:p>
@@ -2332,7 +2334,7 @@
           <a:p>
             <a:fld id="{C764DE79-268F-4C1A-8933-263129D2AF90}" type="datetimeFigureOut">
               <a:rPr lang="en-US" dirty="0"/>
-              <a:t>1/4/23</a:t>
+              <a:t>2/3/2023</a:t>
             </a:fld>
             <a:endParaRPr lang="en-US"/>
           </a:p>
@@ -2543,7 +2545,7 @@
           <a:p>
             <a:fld id="{C764DE79-268F-4C1A-8933-263129D2AF90}" type="datetimeFigureOut">
               <a:rPr lang="en-US" dirty="0"/>
-              <a:t>1/4/23</a:t>
+              <a:t>2/3/2023</a:t>
             </a:fld>
             <a:endParaRPr lang="en-US"/>
           </a:p>
@@ -3438,7 +3440,7 @@
           <p:nvPr/>
         </p:nvPicPr>
         <p:blipFill rotWithShape="1">
-          <a:blip r:embed="rId5">
+          <a:blip r:embed="rId5" cstate="print">
             <a:extLst>
               <a:ext uri="{28A0092B-C50C-407E-A947-70E740481C1C}">
                 <a14:useLocalDpi xmlns:a14="http://schemas.microsoft.com/office/drawing/2010/main" val="0"/>
@@ -3473,7 +3475,7 @@
           <p:nvPr/>
         </p:nvPicPr>
         <p:blipFill>
-          <a:blip r:embed="rId6">
+          <a:blip r:embed="rId6" cstate="print">
             <a:extLst>
               <a:ext uri="{28A0092B-C50C-407E-A947-70E740481C1C}">
                 <a14:useLocalDpi xmlns:a14="http://schemas.microsoft.com/office/drawing/2010/main" val="0"/>
@@ -3498,6 +3500,825 @@
     <p:extLst>
       <p:ext uri="{BB962C8B-B14F-4D97-AF65-F5344CB8AC3E}">
         <p14:creationId xmlns:p14="http://schemas.microsoft.com/office/powerpoint/2010/main" val="3024348813"/>
+      </p:ext>
+    </p:extLst>
+  </p:cSld>
+  <p:clrMapOvr>
+    <a:masterClrMapping/>
+  </p:clrMapOvr>
+</p:sld>
+</file>
+
+<file path=ppt/slides/slide2.xml><?xml version="1.0" encoding="utf-8"?>
+<p:sld xmlns:a="http://schemas.openxmlformats.org/drawingml/2006/main" xmlns:r="http://schemas.openxmlformats.org/officeDocument/2006/relationships" xmlns:p="http://schemas.openxmlformats.org/presentationml/2006/main">
+  <p:cSld>
+    <p:spTree>
+      <p:nvGrpSpPr>
+        <p:cNvPr id="1" name=""/>
+        <p:cNvGrpSpPr/>
+        <p:nvPr/>
+      </p:nvGrpSpPr>
+      <p:grpSpPr>
+        <a:xfrm>
+          <a:off x="0" y="0"/>
+          <a:ext cx="0" cy="0"/>
+          <a:chOff x="0" y="0"/>
+          <a:chExt cx="0" cy="0"/>
+        </a:xfrm>
+      </p:grpSpPr>
+      <p:pic>
+        <p:nvPicPr>
+          <p:cNvPr id="14" name="Picture 13" descr="A body of water with trees and buildings in the background&#10;&#10;Description automatically generated with medium confidence">
+            <a:extLst>
+              <a:ext uri="{FF2B5EF4-FFF2-40B4-BE49-F238E27FC236}">
+                <a16:creationId xmlns:a16="http://schemas.microsoft.com/office/drawing/2014/main" id="{994A2BD2-39FB-6700-CABB-DECE8DF62E38}"/>
+              </a:ext>
+            </a:extLst>
+          </p:cNvPr>
+          <p:cNvPicPr>
+            <a:picLocks noChangeAspect="1"/>
+          </p:cNvPicPr>
+          <p:nvPr/>
+        </p:nvPicPr>
+        <p:blipFill rotWithShape="1">
+          <a:blip r:embed="rId2">
+            <a:extLst>
+              <a:ext uri="{28A0092B-C50C-407E-A947-70E740481C1C}">
+                <a14:useLocalDpi xmlns:a14="http://schemas.microsoft.com/office/drawing/2010/main" val="0"/>
+              </a:ext>
+            </a:extLst>
+          </a:blip>
+          <a:srcRect b="15703"/>
+          <a:stretch/>
+        </p:blipFill>
+        <p:spPr>
+          <a:xfrm>
+            <a:off x="0" y="0"/>
+            <a:ext cx="12192000" cy="6845847"/>
+          </a:xfrm>
+          <a:prstGeom prst="rect">
+            <a:avLst/>
+          </a:prstGeom>
+        </p:spPr>
+      </p:pic>
+      <p:sp>
+        <p:nvSpPr>
+          <p:cNvPr id="15" name="Rectangle: Rounded Corners 14">
+            <a:extLst>
+              <a:ext uri="{FF2B5EF4-FFF2-40B4-BE49-F238E27FC236}">
+                <a16:creationId xmlns:a16="http://schemas.microsoft.com/office/drawing/2014/main" id="{07502EDD-C326-AC68-E8B4-919866E9E092}"/>
+              </a:ext>
+            </a:extLst>
+          </p:cNvPr>
+          <p:cNvSpPr/>
+          <p:nvPr/>
+        </p:nvSpPr>
+        <p:spPr>
+          <a:xfrm>
+            <a:off x="-733777" y="-115711"/>
+            <a:ext cx="7336256" cy="7089422"/>
+          </a:xfrm>
+          <a:prstGeom prst="roundRect">
+            <a:avLst/>
+          </a:prstGeom>
+          <a:solidFill>
+            <a:srgbClr val="FFFFFF">
+              <a:alpha val="69804"/>
+            </a:srgbClr>
+          </a:solidFill>
+          <a:ln>
+            <a:solidFill>
+              <a:schemeClr val="bg1"/>
+            </a:solidFill>
+          </a:ln>
+        </p:spPr>
+        <p:style>
+          <a:lnRef idx="2">
+            <a:schemeClr val="accent1">
+              <a:shade val="50000"/>
+            </a:schemeClr>
+          </a:lnRef>
+          <a:fillRef idx="1">
+            <a:schemeClr val="accent1"/>
+          </a:fillRef>
+          <a:effectRef idx="0">
+            <a:schemeClr val="accent1"/>
+          </a:effectRef>
+          <a:fontRef idx="minor">
+            <a:schemeClr val="lt1"/>
+          </a:fontRef>
+        </p:style>
+        <p:txBody>
+          <a:bodyPr rtlCol="0" anchor="ctr"/>
+          <a:lstStyle/>
+          <a:p>
+            <a:pPr algn="ctr" rtl="0" fontAlgn="base"/>
+            <a:endParaRPr lang="en-US" sz="4000" b="0" i="0" dirty="0">
+              <a:solidFill>
+                <a:schemeClr val="tx1"/>
+              </a:solidFill>
+              <a:effectLst/>
+              <a:latin typeface="Segoe UI" panose="020B0502040204020203" pitchFamily="34" charset="0"/>
+            </a:endParaRPr>
+          </a:p>
+        </p:txBody>
+      </p:sp>
+      <p:pic>
+        <p:nvPicPr>
+          <p:cNvPr id="5" name="Picture 4" descr="Application&#10;&#10;Description automatically generated with medium confidence">
+            <a:extLst>
+              <a:ext uri="{FF2B5EF4-FFF2-40B4-BE49-F238E27FC236}">
+                <a16:creationId xmlns:a16="http://schemas.microsoft.com/office/drawing/2014/main" id="{B6F5286B-AB3C-0682-6187-EDEC6C96489F}"/>
+              </a:ext>
+            </a:extLst>
+          </p:cNvPr>
+          <p:cNvPicPr>
+            <a:picLocks noChangeAspect="1"/>
+          </p:cNvPicPr>
+          <p:nvPr/>
+        </p:nvPicPr>
+        <p:blipFill rotWithShape="1">
+          <a:blip r:embed="rId3" cstate="print">
+            <a:extLst>
+              <a:ext uri="{28A0092B-C50C-407E-A947-70E740481C1C}">
+                <a14:useLocalDpi xmlns:a14="http://schemas.microsoft.com/office/drawing/2010/main" val="0"/>
+              </a:ext>
+            </a:extLst>
+          </a:blip>
+          <a:srcRect t="20502"/>
+          <a:stretch/>
+        </p:blipFill>
+        <p:spPr>
+          <a:xfrm>
+            <a:off x="46149" y="5916821"/>
+            <a:ext cx="2116272" cy="1024802"/>
+          </a:xfrm>
+          <a:prstGeom prst="rect">
+            <a:avLst/>
+          </a:prstGeom>
+        </p:spPr>
+      </p:pic>
+      <p:pic>
+        <p:nvPicPr>
+          <p:cNvPr id="10" name="Picture 9" descr="A picture containing window&#10;&#10;Description automatically generated">
+            <a:extLst>
+              <a:ext uri="{FF2B5EF4-FFF2-40B4-BE49-F238E27FC236}">
+                <a16:creationId xmlns:a16="http://schemas.microsoft.com/office/drawing/2014/main" id="{D42C1B0D-68EA-3E9B-C377-8F8D8354E8BB}"/>
+              </a:ext>
+            </a:extLst>
+          </p:cNvPr>
+          <p:cNvPicPr>
+            <a:picLocks noChangeAspect="1"/>
+          </p:cNvPicPr>
+          <p:nvPr/>
+        </p:nvPicPr>
+        <p:blipFill>
+          <a:blip r:embed="rId4" cstate="print">
+            <a:extLst>
+              <a:ext uri="{28A0092B-C50C-407E-A947-70E740481C1C}">
+                <a14:useLocalDpi xmlns:a14="http://schemas.microsoft.com/office/drawing/2010/main" val="0"/>
+              </a:ext>
+            </a:extLst>
+          </a:blip>
+          <a:stretch>
+            <a:fillRect/>
+          </a:stretch>
+        </p:blipFill>
+        <p:spPr>
+          <a:xfrm>
+            <a:off x="46146" y="4892020"/>
+            <a:ext cx="1395779" cy="1024801"/>
+          </a:xfrm>
+          <a:prstGeom prst="rect">
+            <a:avLst/>
+          </a:prstGeom>
+        </p:spPr>
+      </p:pic>
+      <p:sp>
+        <p:nvSpPr>
+          <p:cNvPr id="16" name="TextBox 15">
+            <a:extLst>
+              <a:ext uri="{FF2B5EF4-FFF2-40B4-BE49-F238E27FC236}">
+                <a16:creationId xmlns:a16="http://schemas.microsoft.com/office/drawing/2014/main" id="{83CE7D1B-50CB-6DE3-9CF7-9B7997233177}"/>
+              </a:ext>
+            </a:extLst>
+          </p:cNvPr>
+          <p:cNvSpPr txBox="1"/>
+          <p:nvPr/>
+        </p:nvSpPr>
+        <p:spPr>
+          <a:xfrm>
+            <a:off x="372533" y="1003215"/>
+            <a:ext cx="5565422" cy="4401205"/>
+          </a:xfrm>
+          <a:prstGeom prst="rect">
+            <a:avLst/>
+          </a:prstGeom>
+          <a:noFill/>
+        </p:spPr>
+        <p:txBody>
+          <a:bodyPr wrap="square" rtlCol="0">
+            <a:spAutoFit/>
+          </a:bodyPr>
+          <a:lstStyle/>
+          <a:p>
+            <a:pPr algn="ctr" rtl="0" fontAlgn="base"/>
+            <a:r>
+              <a:rPr lang="en-US" sz="4000" b="1" i="0" dirty="0">
+                <a:solidFill>
+                  <a:schemeClr val="tx1"/>
+                </a:solidFill>
+                <a:effectLst/>
+                <a:latin typeface="Arvo" panose="02000000000000000000" pitchFamily="2" charset="77"/>
+              </a:rPr>
+              <a:t>3 day in person workshop</a:t>
+            </a:r>
+            <a:endParaRPr lang="en-US" sz="4000" b="0" i="0" u="none" strike="noStrike" dirty="0">
+              <a:solidFill>
+                <a:schemeClr val="tx1"/>
+              </a:solidFill>
+              <a:effectLst/>
+              <a:latin typeface="Arvo" panose="02000000000000000000" pitchFamily="2" charset="77"/>
+            </a:endParaRPr>
+          </a:p>
+          <a:p>
+            <a:pPr algn="ctr" fontAlgn="base">
+              <a:buClr>
+                <a:schemeClr val="tx1"/>
+              </a:buClr>
+              <a:buSzPct val="150000"/>
+            </a:pPr>
+            <a:r>
+              <a:rPr lang="en-US" sz="4000" b="0" i="0" u="none" strike="noStrike" dirty="0">
+                <a:solidFill>
+                  <a:schemeClr val="tx1"/>
+                </a:solidFill>
+                <a:effectLst/>
+                <a:latin typeface="Arvo" panose="02000000000000000000" pitchFamily="2" charset="77"/>
+              </a:rPr>
+              <a:t>In person</a:t>
+            </a:r>
+          </a:p>
+          <a:p>
+            <a:pPr algn="ctr" fontAlgn="base">
+              <a:buClr>
+                <a:schemeClr val="tx1"/>
+              </a:buClr>
+              <a:buSzPct val="150000"/>
+            </a:pPr>
+            <a:r>
+              <a:rPr lang="en-US" sz="4000" dirty="0">
+                <a:solidFill>
+                  <a:schemeClr val="tx1"/>
+                </a:solidFill>
+                <a:latin typeface="Arvo" panose="02000000000000000000" pitchFamily="2" charset="77"/>
+              </a:rPr>
+              <a:t>April 19</a:t>
+            </a:r>
+            <a:r>
+              <a:rPr lang="en-US" sz="4000" baseline="30000" dirty="0">
+                <a:solidFill>
+                  <a:schemeClr val="tx1"/>
+                </a:solidFill>
+                <a:latin typeface="Arvo" panose="02000000000000000000" pitchFamily="2" charset="77"/>
+              </a:rPr>
+              <a:t>th</a:t>
+            </a:r>
+            <a:r>
+              <a:rPr lang="en-US" sz="4000" dirty="0">
+                <a:solidFill>
+                  <a:schemeClr val="tx1"/>
+                </a:solidFill>
+                <a:latin typeface="Arvo" panose="02000000000000000000" pitchFamily="2" charset="77"/>
+              </a:rPr>
+              <a:t> – 21st</a:t>
+            </a:r>
+            <a:r>
+              <a:rPr lang="en-US" sz="4000" b="0" i="0" u="none" strike="noStrike" dirty="0">
+                <a:solidFill>
+                  <a:schemeClr val="tx1"/>
+                </a:solidFill>
+                <a:effectLst/>
+                <a:latin typeface="Arvo" panose="02000000000000000000" pitchFamily="2" charset="77"/>
+              </a:rPr>
+              <a:t> 2023</a:t>
+            </a:r>
+            <a:r>
+              <a:rPr lang="en-US" sz="4000" b="0" i="0" dirty="0">
+                <a:solidFill>
+                  <a:schemeClr val="tx1"/>
+                </a:solidFill>
+                <a:effectLst/>
+                <a:latin typeface="Arvo" panose="02000000000000000000" pitchFamily="2" charset="77"/>
+              </a:rPr>
+              <a:t>​</a:t>
+            </a:r>
+            <a:endParaRPr lang="en-US" sz="4000" b="0" i="0" dirty="0">
+              <a:solidFill>
+                <a:schemeClr val="tx1"/>
+              </a:solidFill>
+              <a:effectLst/>
+              <a:latin typeface="Segoe UI" panose="020B0502040204020203" pitchFamily="34" charset="0"/>
+            </a:endParaRPr>
+          </a:p>
+          <a:p>
+            <a:pPr algn="ctr" rtl="0" fontAlgn="base"/>
+            <a:endParaRPr lang="en-US" sz="4000" b="0" i="0" u="none" strike="noStrike" dirty="0">
+              <a:solidFill>
+                <a:schemeClr val="tx1"/>
+              </a:solidFill>
+              <a:effectLst/>
+              <a:latin typeface="Arvo" panose="02000000000000000000" pitchFamily="2" charset="77"/>
+            </a:endParaRPr>
+          </a:p>
+          <a:p>
+            <a:pPr algn="ctr" rtl="0" fontAlgn="base"/>
+            <a:r>
+              <a:rPr lang="en-US" sz="4000" dirty="0">
+                <a:solidFill>
+                  <a:schemeClr val="tx1"/>
+                </a:solidFill>
+                <a:latin typeface="Arvo" panose="02000000000000000000" pitchFamily="2" charset="77"/>
+              </a:rPr>
+              <a:t> </a:t>
+            </a:r>
+            <a:r>
+              <a:rPr lang="en-US" sz="4000" b="0" i="0" u="none" strike="noStrike" dirty="0">
+                <a:solidFill>
+                  <a:schemeClr val="tx1"/>
+                </a:solidFill>
+                <a:effectLst/>
+                <a:latin typeface="Arvo" panose="02000000000000000000" pitchFamily="2" charset="77"/>
+              </a:rPr>
+              <a:t>Click </a:t>
+            </a:r>
+            <a:r>
+              <a:rPr lang="en-US" sz="4000" dirty="0">
+                <a:solidFill>
+                  <a:schemeClr val="tx1"/>
+                </a:solidFill>
+                <a:latin typeface="Arvo" panose="02000000000000000000" pitchFamily="2" charset="77"/>
+              </a:rPr>
+              <a:t>for more details</a:t>
+            </a:r>
+            <a:endParaRPr lang="en-US" sz="4000" b="0" i="0" dirty="0">
+              <a:solidFill>
+                <a:schemeClr val="tx1"/>
+              </a:solidFill>
+              <a:effectLst/>
+              <a:latin typeface="Segoe UI" panose="020B0502040204020203" pitchFamily="34" charset="0"/>
+            </a:endParaRPr>
+          </a:p>
+        </p:txBody>
+      </p:sp>
+      <p:pic>
+        <p:nvPicPr>
+          <p:cNvPr id="18" name="Graphic 17" descr="Male profile with solid fill">
+            <a:extLst>
+              <a:ext uri="{FF2B5EF4-FFF2-40B4-BE49-F238E27FC236}">
+                <a16:creationId xmlns:a16="http://schemas.microsoft.com/office/drawing/2014/main" id="{4E06154E-B36C-4BE0-F9D3-3C3D820947EE}"/>
+              </a:ext>
+            </a:extLst>
+          </p:cNvPr>
+          <p:cNvPicPr>
+            <a:picLocks noChangeAspect="1"/>
+          </p:cNvPicPr>
+          <p:nvPr/>
+        </p:nvPicPr>
+        <p:blipFill>
+          <a:blip r:embed="rId5">
+            <a:extLst>
+              <a:ext uri="{28A0092B-C50C-407E-A947-70E740481C1C}">
+                <a14:useLocalDpi xmlns:a14="http://schemas.microsoft.com/office/drawing/2010/main" val="0"/>
+              </a:ext>
+              <a:ext uri="{96DAC541-7B7A-43D3-8B79-37D633B846F1}">
+                <asvg:svgBlip xmlns:asvg="http://schemas.microsoft.com/office/drawing/2016/SVG/main" r:embed="rId6"/>
+              </a:ext>
+            </a:extLst>
+          </a:blip>
+          <a:stretch>
+            <a:fillRect/>
+          </a:stretch>
+        </p:blipFill>
+        <p:spPr>
+          <a:xfrm>
+            <a:off x="1255888" y="2233595"/>
+            <a:ext cx="657578" cy="657578"/>
+          </a:xfrm>
+          <a:prstGeom prst="rect">
+            <a:avLst/>
+          </a:prstGeom>
+        </p:spPr>
+      </p:pic>
+    </p:spTree>
+    <p:extLst>
+      <p:ext uri="{BB962C8B-B14F-4D97-AF65-F5344CB8AC3E}">
+        <p14:creationId xmlns:p14="http://schemas.microsoft.com/office/powerpoint/2010/main" val="489752953"/>
+      </p:ext>
+    </p:extLst>
+  </p:cSld>
+  <p:clrMapOvr>
+    <a:masterClrMapping/>
+  </p:clrMapOvr>
+</p:sld>
+</file>
+
+<file path=ppt/slides/slide3.xml><?xml version="1.0" encoding="utf-8"?>
+<p:sld xmlns:a="http://schemas.openxmlformats.org/drawingml/2006/main" xmlns:r="http://schemas.openxmlformats.org/officeDocument/2006/relationships" xmlns:p="http://schemas.openxmlformats.org/presentationml/2006/main">
+  <p:cSld>
+    <p:spTree>
+      <p:nvGrpSpPr>
+        <p:cNvPr id="1" name=""/>
+        <p:cNvGrpSpPr/>
+        <p:nvPr/>
+      </p:nvGrpSpPr>
+      <p:grpSpPr>
+        <a:xfrm>
+          <a:off x="0" y="0"/>
+          <a:ext cx="0" cy="0"/>
+          <a:chOff x="0" y="0"/>
+          <a:chExt cx="0" cy="0"/>
+        </a:xfrm>
+      </p:grpSpPr>
+      <p:pic>
+        <p:nvPicPr>
+          <p:cNvPr id="14" name="Picture 13" descr="A body of water with trees and buildings in the background&#10;&#10;Description automatically generated with medium confidence">
+            <a:extLst>
+              <a:ext uri="{FF2B5EF4-FFF2-40B4-BE49-F238E27FC236}">
+                <a16:creationId xmlns:a16="http://schemas.microsoft.com/office/drawing/2014/main" id="{994A2BD2-39FB-6700-CABB-DECE8DF62E38}"/>
+              </a:ext>
+            </a:extLst>
+          </p:cNvPr>
+          <p:cNvPicPr>
+            <a:picLocks noChangeAspect="1"/>
+          </p:cNvPicPr>
+          <p:nvPr/>
+        </p:nvPicPr>
+        <p:blipFill rotWithShape="1">
+          <a:blip r:embed="rId2">
+            <a:extLst>
+              <a:ext uri="{28A0092B-C50C-407E-A947-70E740481C1C}">
+                <a14:useLocalDpi xmlns:a14="http://schemas.microsoft.com/office/drawing/2010/main" val="0"/>
+              </a:ext>
+            </a:extLst>
+          </a:blip>
+          <a:srcRect b="15703"/>
+          <a:stretch/>
+        </p:blipFill>
+        <p:spPr>
+          <a:xfrm>
+            <a:off x="0" y="0"/>
+            <a:ext cx="12192000" cy="6845847"/>
+          </a:xfrm>
+          <a:prstGeom prst="rect">
+            <a:avLst/>
+          </a:prstGeom>
+        </p:spPr>
+      </p:pic>
+      <p:sp>
+        <p:nvSpPr>
+          <p:cNvPr id="15" name="Rectangle: Rounded Corners 14">
+            <a:extLst>
+              <a:ext uri="{FF2B5EF4-FFF2-40B4-BE49-F238E27FC236}">
+                <a16:creationId xmlns:a16="http://schemas.microsoft.com/office/drawing/2014/main" id="{07502EDD-C326-AC68-E8B4-919866E9E092}"/>
+              </a:ext>
+            </a:extLst>
+          </p:cNvPr>
+          <p:cNvSpPr/>
+          <p:nvPr/>
+        </p:nvSpPr>
+        <p:spPr>
+          <a:xfrm>
+            <a:off x="-733777" y="-115711"/>
+            <a:ext cx="7336256" cy="7089422"/>
+          </a:xfrm>
+          <a:prstGeom prst="roundRect">
+            <a:avLst/>
+          </a:prstGeom>
+          <a:solidFill>
+            <a:srgbClr val="FFFFFF">
+              <a:alpha val="69804"/>
+            </a:srgbClr>
+          </a:solidFill>
+          <a:ln>
+            <a:solidFill>
+              <a:schemeClr val="bg1"/>
+            </a:solidFill>
+          </a:ln>
+        </p:spPr>
+        <p:style>
+          <a:lnRef idx="2">
+            <a:schemeClr val="accent1">
+              <a:shade val="50000"/>
+            </a:schemeClr>
+          </a:lnRef>
+          <a:fillRef idx="1">
+            <a:schemeClr val="accent1"/>
+          </a:fillRef>
+          <a:effectRef idx="0">
+            <a:schemeClr val="accent1"/>
+          </a:effectRef>
+          <a:fontRef idx="minor">
+            <a:schemeClr val="lt1"/>
+          </a:fontRef>
+        </p:style>
+        <p:txBody>
+          <a:bodyPr rtlCol="0" anchor="ctr"/>
+          <a:lstStyle/>
+          <a:p>
+            <a:pPr algn="ctr" rtl="0" fontAlgn="base"/>
+            <a:endParaRPr lang="en-US" sz="4000" b="0" i="0" dirty="0">
+              <a:solidFill>
+                <a:schemeClr val="tx1"/>
+              </a:solidFill>
+              <a:effectLst/>
+              <a:latin typeface="Segoe UI" panose="020B0502040204020203" pitchFamily="34" charset="0"/>
+            </a:endParaRPr>
+          </a:p>
+        </p:txBody>
+      </p:sp>
+      <p:pic>
+        <p:nvPicPr>
+          <p:cNvPr id="5" name="Picture 4" descr="Application&#10;&#10;Description automatically generated with medium confidence">
+            <a:extLst>
+              <a:ext uri="{FF2B5EF4-FFF2-40B4-BE49-F238E27FC236}">
+                <a16:creationId xmlns:a16="http://schemas.microsoft.com/office/drawing/2014/main" id="{B6F5286B-AB3C-0682-6187-EDEC6C96489F}"/>
+              </a:ext>
+            </a:extLst>
+          </p:cNvPr>
+          <p:cNvPicPr>
+            <a:picLocks noChangeAspect="1"/>
+          </p:cNvPicPr>
+          <p:nvPr/>
+        </p:nvPicPr>
+        <p:blipFill rotWithShape="1">
+          <a:blip r:embed="rId3" cstate="print">
+            <a:extLst>
+              <a:ext uri="{28A0092B-C50C-407E-A947-70E740481C1C}">
+                <a14:useLocalDpi xmlns:a14="http://schemas.microsoft.com/office/drawing/2010/main" val="0"/>
+              </a:ext>
+            </a:extLst>
+          </a:blip>
+          <a:srcRect t="20502"/>
+          <a:stretch/>
+        </p:blipFill>
+        <p:spPr>
+          <a:xfrm>
+            <a:off x="46149" y="5916821"/>
+            <a:ext cx="2116272" cy="1024802"/>
+          </a:xfrm>
+          <a:prstGeom prst="rect">
+            <a:avLst/>
+          </a:prstGeom>
+        </p:spPr>
+      </p:pic>
+      <p:pic>
+        <p:nvPicPr>
+          <p:cNvPr id="10" name="Picture 9" descr="A picture containing window&#10;&#10;Description automatically generated">
+            <a:extLst>
+              <a:ext uri="{FF2B5EF4-FFF2-40B4-BE49-F238E27FC236}">
+                <a16:creationId xmlns:a16="http://schemas.microsoft.com/office/drawing/2014/main" id="{D42C1B0D-68EA-3E9B-C377-8F8D8354E8BB}"/>
+              </a:ext>
+            </a:extLst>
+          </p:cNvPr>
+          <p:cNvPicPr>
+            <a:picLocks noChangeAspect="1"/>
+          </p:cNvPicPr>
+          <p:nvPr/>
+        </p:nvPicPr>
+        <p:blipFill>
+          <a:blip r:embed="rId4" cstate="print">
+            <a:extLst>
+              <a:ext uri="{28A0092B-C50C-407E-A947-70E740481C1C}">
+                <a14:useLocalDpi xmlns:a14="http://schemas.microsoft.com/office/drawing/2010/main" val="0"/>
+              </a:ext>
+            </a:extLst>
+          </a:blip>
+          <a:stretch>
+            <a:fillRect/>
+          </a:stretch>
+        </p:blipFill>
+        <p:spPr>
+          <a:xfrm>
+            <a:off x="46146" y="4892020"/>
+            <a:ext cx="1395779" cy="1024801"/>
+          </a:xfrm>
+          <a:prstGeom prst="rect">
+            <a:avLst/>
+          </a:prstGeom>
+        </p:spPr>
+      </p:pic>
+      <p:sp>
+        <p:nvSpPr>
+          <p:cNvPr id="16" name="TextBox 15">
+            <a:extLst>
+              <a:ext uri="{FF2B5EF4-FFF2-40B4-BE49-F238E27FC236}">
+                <a16:creationId xmlns:a16="http://schemas.microsoft.com/office/drawing/2014/main" id="{83CE7D1B-50CB-6DE3-9CF7-9B7997233177}"/>
+              </a:ext>
+            </a:extLst>
+          </p:cNvPr>
+          <p:cNvSpPr txBox="1"/>
+          <p:nvPr/>
+        </p:nvSpPr>
+        <p:spPr>
+          <a:xfrm>
+            <a:off x="372533" y="1003215"/>
+            <a:ext cx="5565422" cy="4401205"/>
+          </a:xfrm>
+          <a:prstGeom prst="rect">
+            <a:avLst/>
+          </a:prstGeom>
+          <a:noFill/>
+        </p:spPr>
+        <p:txBody>
+          <a:bodyPr wrap="square" rtlCol="0">
+            <a:spAutoFit/>
+          </a:bodyPr>
+          <a:lstStyle/>
+          <a:p>
+            <a:pPr algn="ctr" rtl="0" fontAlgn="base"/>
+            <a:r>
+              <a:rPr lang="en-US" sz="4000" b="1" i="0" dirty="0">
+                <a:solidFill>
+                  <a:schemeClr val="tx1"/>
+                </a:solidFill>
+                <a:effectLst/>
+                <a:latin typeface="Arvo" panose="02000000000000000000" pitchFamily="2" charset="77"/>
+              </a:rPr>
+              <a:t>3 day in person workshop</a:t>
+            </a:r>
+            <a:endParaRPr lang="en-US" sz="4000" b="0" i="0" u="none" strike="noStrike" dirty="0">
+              <a:solidFill>
+                <a:schemeClr val="tx1"/>
+              </a:solidFill>
+              <a:effectLst/>
+              <a:latin typeface="Arvo" panose="02000000000000000000" pitchFamily="2" charset="77"/>
+            </a:endParaRPr>
+          </a:p>
+          <a:p>
+            <a:pPr algn="ctr" fontAlgn="base">
+              <a:buClr>
+                <a:schemeClr val="tx1"/>
+              </a:buClr>
+              <a:buSzPct val="150000"/>
+            </a:pPr>
+            <a:r>
+              <a:rPr lang="en-US" sz="4000" b="0" i="0" u="none" strike="noStrike" dirty="0">
+                <a:solidFill>
+                  <a:schemeClr val="tx1"/>
+                </a:solidFill>
+                <a:effectLst/>
+                <a:latin typeface="Arvo" panose="02000000000000000000" pitchFamily="2" charset="77"/>
+              </a:rPr>
+              <a:t>In person</a:t>
+            </a:r>
+          </a:p>
+          <a:p>
+            <a:pPr algn="ctr" fontAlgn="base">
+              <a:buClr>
+                <a:schemeClr val="tx1"/>
+              </a:buClr>
+              <a:buSzPct val="150000"/>
+            </a:pPr>
+            <a:r>
+              <a:rPr lang="en-US" sz="4000">
+                <a:solidFill>
+                  <a:schemeClr val="tx1"/>
+                </a:solidFill>
+                <a:latin typeface="Arvo" panose="02000000000000000000" pitchFamily="2" charset="77"/>
+              </a:rPr>
+              <a:t>March 8th– </a:t>
+            </a:r>
+            <a:r>
+              <a:rPr lang="en-US" sz="4000" dirty="0">
+                <a:solidFill>
+                  <a:schemeClr val="tx1"/>
+                </a:solidFill>
+                <a:latin typeface="Arvo" panose="02000000000000000000" pitchFamily="2" charset="77"/>
+              </a:rPr>
+              <a:t>21st</a:t>
+            </a:r>
+            <a:r>
+              <a:rPr lang="en-US" sz="4000" b="0" i="0" u="none" strike="noStrike" dirty="0">
+                <a:solidFill>
+                  <a:schemeClr val="tx1"/>
+                </a:solidFill>
+                <a:effectLst/>
+                <a:latin typeface="Arvo" panose="02000000000000000000" pitchFamily="2" charset="77"/>
+              </a:rPr>
+              <a:t> 2023</a:t>
+            </a:r>
+            <a:r>
+              <a:rPr lang="en-US" sz="4000" b="0" i="0" dirty="0">
+                <a:solidFill>
+                  <a:schemeClr val="tx1"/>
+                </a:solidFill>
+                <a:effectLst/>
+                <a:latin typeface="Arvo" panose="02000000000000000000" pitchFamily="2" charset="77"/>
+              </a:rPr>
+              <a:t>​</a:t>
+            </a:r>
+            <a:endParaRPr lang="en-US" sz="4000" b="0" i="0" dirty="0">
+              <a:solidFill>
+                <a:schemeClr val="tx1"/>
+              </a:solidFill>
+              <a:effectLst/>
+              <a:latin typeface="Segoe UI" panose="020B0502040204020203" pitchFamily="34" charset="0"/>
+            </a:endParaRPr>
+          </a:p>
+          <a:p>
+            <a:pPr algn="ctr" rtl="0" fontAlgn="base"/>
+            <a:endParaRPr lang="en-US" sz="4000" b="0" i="0" u="none" strike="noStrike" dirty="0">
+              <a:solidFill>
+                <a:schemeClr val="tx1"/>
+              </a:solidFill>
+              <a:effectLst/>
+              <a:latin typeface="Arvo" panose="02000000000000000000" pitchFamily="2" charset="77"/>
+            </a:endParaRPr>
+          </a:p>
+          <a:p>
+            <a:pPr algn="ctr" rtl="0" fontAlgn="base"/>
+            <a:r>
+              <a:rPr lang="en-US" sz="4000" dirty="0">
+                <a:solidFill>
+                  <a:schemeClr val="tx1"/>
+                </a:solidFill>
+                <a:latin typeface="Arvo" panose="02000000000000000000" pitchFamily="2" charset="77"/>
+              </a:rPr>
+              <a:t> </a:t>
+            </a:r>
+            <a:r>
+              <a:rPr lang="en-US" sz="4000" b="0" i="0" u="none" strike="noStrike" dirty="0">
+                <a:solidFill>
+                  <a:schemeClr val="tx1"/>
+                </a:solidFill>
+                <a:effectLst/>
+                <a:latin typeface="Arvo" panose="02000000000000000000" pitchFamily="2" charset="77"/>
+              </a:rPr>
+              <a:t>Click </a:t>
+            </a:r>
+            <a:r>
+              <a:rPr lang="en-US" sz="4000" dirty="0">
+                <a:solidFill>
+                  <a:schemeClr val="tx1"/>
+                </a:solidFill>
+                <a:latin typeface="Arvo" panose="02000000000000000000" pitchFamily="2" charset="77"/>
+              </a:rPr>
+              <a:t>for more details</a:t>
+            </a:r>
+            <a:endParaRPr lang="en-US" sz="4000" b="0" i="0" dirty="0">
+              <a:solidFill>
+                <a:schemeClr val="tx1"/>
+              </a:solidFill>
+              <a:effectLst/>
+              <a:latin typeface="Segoe UI" panose="020B0502040204020203" pitchFamily="34" charset="0"/>
+            </a:endParaRPr>
+          </a:p>
+        </p:txBody>
+      </p:sp>
+      <p:pic>
+        <p:nvPicPr>
+          <p:cNvPr id="18" name="Graphic 17" descr="Male profile with solid fill">
+            <a:extLst>
+              <a:ext uri="{FF2B5EF4-FFF2-40B4-BE49-F238E27FC236}">
+                <a16:creationId xmlns:a16="http://schemas.microsoft.com/office/drawing/2014/main" id="{4E06154E-B36C-4BE0-F9D3-3C3D820947EE}"/>
+              </a:ext>
+            </a:extLst>
+          </p:cNvPr>
+          <p:cNvPicPr>
+            <a:picLocks noChangeAspect="1"/>
+          </p:cNvPicPr>
+          <p:nvPr/>
+        </p:nvPicPr>
+        <p:blipFill>
+          <a:blip r:embed="rId5">
+            <a:extLst>
+              <a:ext uri="{28A0092B-C50C-407E-A947-70E740481C1C}">
+                <a14:useLocalDpi xmlns:a14="http://schemas.microsoft.com/office/drawing/2010/main" val="0"/>
+              </a:ext>
+              <a:ext uri="{96DAC541-7B7A-43D3-8B79-37D633B846F1}">
+                <asvg:svgBlip xmlns:asvg="http://schemas.microsoft.com/office/drawing/2016/SVG/main" r:embed="rId6"/>
+              </a:ext>
+            </a:extLst>
+          </a:blip>
+          <a:stretch>
+            <a:fillRect/>
+          </a:stretch>
+        </p:blipFill>
+        <p:spPr>
+          <a:xfrm>
+            <a:off x="1255888" y="2233595"/>
+            <a:ext cx="657578" cy="657578"/>
+          </a:xfrm>
+          <a:prstGeom prst="rect">
+            <a:avLst/>
+          </a:prstGeom>
+        </p:spPr>
+      </p:pic>
+    </p:spTree>
+    <p:extLst>
+      <p:ext uri="{BB962C8B-B14F-4D97-AF65-F5344CB8AC3E}">
+        <p14:creationId xmlns:p14="http://schemas.microsoft.com/office/powerpoint/2010/main" val="2750436012"/>
       </p:ext>
     </p:extLst>
   </p:cSld>

</xml_diff>